<commit_message>
change sizeo from B5 to A5
</commit_message>
<xml_diff>
--- a/img/pki.pptx
+++ b/img/pki.pptx
@@ -151,7 +151,7 @@
       </p14:sectionLst>
     </p:ext>
     <p:ext uri="{EFAFB233-063F-42B5-8137-9DF3F51BA10A}">
-      <p15:sldGuideLst xmlns="" xmlns:p15="http://schemas.microsoft.com/office/powerpoint/2012/main">
+      <p15:sldGuideLst xmlns:p15="http://schemas.microsoft.com/office/powerpoint/2012/main" xmlns="">
         <p15:guide id="1" orient="horz" pos="2160">
           <p15:clr>
             <a:srgbClr val="A4A3A4"/>
@@ -165,7 +165,7 @@
       </p15:sldGuideLst>
     </p:ext>
     <p:ext uri="{2D200454-40CA-4A62-9FC3-DE9A4176ACB9}">
-      <p15:notesGuideLst xmlns="" xmlns:p15="http://schemas.microsoft.com/office/powerpoint/2012/main">
+      <p15:notesGuideLst xmlns:p15="http://schemas.microsoft.com/office/powerpoint/2012/main" xmlns="">
         <p15:guide id="1" orient="horz" pos="3223">
           <p15:clr>
             <a:srgbClr val="A4A3A4"/>
@@ -2426,39 +2426,7 @@
                 <a:ea typeface="HG丸ｺﾞｼｯｸM-PRO" panose="020F0600000000000000" pitchFamily="50" charset="-128"/>
                 <a:cs typeface="Courier New" pitchFamily="49" charset="0"/>
               </a:rPr>
-              <a:t>デジタル</a:t>
-            </a:r>
-            <a:r>
-              <a:rPr lang="ja-JP" altLang="en-US" sz="1100" smtClean="0">
-                <a:latin typeface="HG丸ｺﾞｼｯｸM-PRO" panose="020F0600000000000000" pitchFamily="50" charset="-128"/>
-                <a:ea typeface="HG丸ｺﾞｼｯｸM-PRO" panose="020F0600000000000000" pitchFamily="50" charset="-128"/>
-                <a:cs typeface="Courier New" pitchFamily="49" charset="0"/>
-              </a:rPr>
-              <a:t>署名</a:t>
-            </a:r>
-            <a:r>
-              <a:rPr lang="ja-JP" altLang="en-US" sz="1100" smtClean="0">
-                <a:latin typeface="HG丸ｺﾞｼｯｸM-PRO" panose="020F0600000000000000" pitchFamily="50" charset="-128"/>
-                <a:ea typeface="HG丸ｺﾞｼｯｸM-PRO" panose="020F0600000000000000" pitchFamily="50" charset="-128"/>
-                <a:cs typeface="Courier New" pitchFamily="49" charset="0"/>
-              </a:rPr>
-              <a:t>の</a:t>
-            </a:r>
-            <a:r>
-              <a:rPr lang="ja-JP" altLang="en-US" sz="1100" smtClean="0">
-                <a:latin typeface="HG丸ｺﾞｼｯｸM-PRO" panose="020F0600000000000000" pitchFamily="50" charset="-128"/>
-                <a:ea typeface="HG丸ｺﾞｼｯｸM-PRO" panose="020F0600000000000000" pitchFamily="50" charset="-128"/>
-                <a:cs typeface="Courier New" pitchFamily="49" charset="0"/>
-              </a:rPr>
-              <a:t>公開</a:t>
-            </a:r>
-            <a:r>
-              <a:rPr lang="ja-JP" altLang="en-US" sz="1100" smtClean="0">
-                <a:latin typeface="HG丸ｺﾞｼｯｸM-PRO" panose="020F0600000000000000" pitchFamily="50" charset="-128"/>
-                <a:ea typeface="HG丸ｺﾞｼｯｸM-PRO" panose="020F0600000000000000" pitchFamily="50" charset="-128"/>
-                <a:cs typeface="Courier New" pitchFamily="49" charset="0"/>
-              </a:rPr>
-              <a:t>鍵</a:t>
+              <a:t>デジタル署名の公開鍵</a:t>
             </a:r>
             <a:endParaRPr lang="ja-JP" altLang="en-US" sz="1100">
               <a:latin typeface="HG丸ｺﾞｼｯｸM-PRO" panose="020F0600000000000000" pitchFamily="50" charset="-128"/>
@@ -2767,7 +2735,7 @@
         </p:nvGrpSpPr>
         <p:grpSpPr>
           <a:xfrm>
-            <a:off x="2646040" y="549796"/>
+            <a:off x="2150781" y="2566020"/>
             <a:ext cx="2007427" cy="197405"/>
             <a:chOff x="2656827" y="462476"/>
             <a:chExt cx="2007427" cy="197405"/>

</xml_diff>